<commit_message>
Add CQRS and DDD
</commit_message>
<xml_diff>
--- a/Prezentacija.pptx
+++ b/Prezentacija.pptx
@@ -12474,7 +12474,7 @@
         </p:nvSpPr>
         <p:spPr>
           <a:xfrm>
-            <a:off x="0" y="62144"/>
+            <a:off x="0" y="0"/>
             <a:ext cx="12192000" cy="705205"/>
           </a:xfrm>
         </p:spPr>
@@ -12505,8 +12505,8 @@
         </p:nvSpPr>
         <p:spPr>
           <a:xfrm>
-            <a:off x="994299" y="1162975"/>
-            <a:ext cx="10857390" cy="1200329"/>
+            <a:off x="951167" y="705205"/>
+            <a:ext cx="10857390" cy="1477328"/>
           </a:xfrm>
           <a:prstGeom prst="rect">
             <a:avLst/>
@@ -12554,6 +12554,16 @@
             <a:r>
               <a:rPr lang="sr-Latn-RS" dirty="0"/>
               <a:t>egregation</a:t>
+            </a:r>
+          </a:p>
+          <a:p>
+            <a:pPr marL="285750" indent="-285750">
+              <a:buFont typeface="Arial" panose="020B0604020202020204" pitchFamily="34" charset="0"/>
+              <a:buChar char="•"/>
+            </a:pPr>
+            <a:r>
+              <a:rPr lang="sr-Latn-RS" dirty="0"/>
+              <a:t>Arhitekturni pattern</a:t>
             </a:r>
           </a:p>
           <a:p>
@@ -12616,7 +12626,7 @@
         </p:blipFill>
         <p:spPr>
           <a:xfrm>
-            <a:off x="3349625" y="2188407"/>
+            <a:off x="733329" y="2226941"/>
             <a:ext cx="5492750" cy="2197100"/>
           </a:xfrm>
           <a:prstGeom prst="rect">
@@ -12638,7 +12648,7 @@
         </p:nvSpPr>
         <p:spPr>
           <a:xfrm>
-            <a:off x="1393794" y="4802819"/>
+            <a:off x="7884627" y="2448804"/>
             <a:ext cx="3923930" cy="1477328"/>
           </a:xfrm>
           <a:prstGeom prst="rect">
@@ -12704,8 +12714,8 @@
         </p:nvSpPr>
         <p:spPr>
           <a:xfrm>
-            <a:off x="7448365" y="4802819"/>
-            <a:ext cx="3994952" cy="369332"/>
+            <a:off x="7884627" y="4535400"/>
+            <a:ext cx="4533726" cy="1477328"/>
           </a:xfrm>
           <a:prstGeom prst="rect">
             <a:avLst/>
@@ -12719,9 +12729,148 @@
           <a:lstStyle/>
           <a:p>
             <a:r>
+              <a:rPr lang="sr-Latn-RS" b="1" dirty="0"/>
+              <a:t>Mane:</a:t>
+            </a:r>
+            <a:endParaRPr lang="en-US" b="1" dirty="0"/>
+          </a:p>
+          <a:p>
+            <a:pPr marL="285750" indent="-285750">
+              <a:buFont typeface="Arial" panose="020B0604020202020204" pitchFamily="34" charset="0"/>
+              <a:buChar char="•"/>
+            </a:pPr>
+            <a:r>
+              <a:rPr lang="en-US" dirty="0"/>
+              <a:t>Du</a:t>
+            </a:r>
+            <a:r>
               <a:rPr lang="sr-Latn-RS" dirty="0"/>
-              <a:t>Mane</a:t>
-            </a:r>
+              <a:t>že vreme razvoja</a:t>
+            </a:r>
+          </a:p>
+          <a:p>
+            <a:pPr marL="285750" indent="-285750">
+              <a:buFont typeface="Arial" panose="020B0604020202020204" pitchFamily="34" charset="0"/>
+              <a:buChar char="•"/>
+            </a:pPr>
+            <a:r>
+              <a:rPr lang="sr-Latn-RS" dirty="0"/>
+              <a:t>Nekonzistentnost (u slučaju 2 baze)</a:t>
+            </a:r>
+          </a:p>
+          <a:p>
+            <a:pPr marL="285750" indent="-285750">
+              <a:buFont typeface="Arial" panose="020B0604020202020204" pitchFamily="34" charset="0"/>
+              <a:buChar char="•"/>
+            </a:pPr>
+            <a:r>
+              <a:rPr lang="sr-Latn-RS" dirty="0"/>
+              <a:t>Bespotrebna složenost za jednostavne sisteme</a:t>
+            </a:r>
+            <a:endParaRPr lang="en-US" dirty="0"/>
+          </a:p>
+        </p:txBody>
+      </p:sp>
+      <p:sp>
+        <p:nvSpPr>
+          <p:cNvPr id="7" name="TextBox 6">
+            <a:extLst>
+              <a:ext uri="{FF2B5EF4-FFF2-40B4-BE49-F238E27FC236}">
+                <a16:creationId xmlns:a16="http://schemas.microsoft.com/office/drawing/2014/main" id="{253210C1-4314-1EE7-6258-CAEAD4FAFEC2}"/>
+              </a:ext>
+            </a:extLst>
+          </p:cNvPr>
+          <p:cNvSpPr txBox="1"/>
+          <p:nvPr/>
+        </p:nvSpPr>
+        <p:spPr>
+          <a:xfrm>
+            <a:off x="733330" y="4908430"/>
+            <a:ext cx="6952806" cy="2862322"/>
+          </a:xfrm>
+          <a:prstGeom prst="rect">
+            <a:avLst/>
+          </a:prstGeom>
+          <a:noFill/>
+        </p:spPr>
+        <p:txBody>
+          <a:bodyPr wrap="square" rtlCol="0">
+            <a:spAutoFit/>
+          </a:bodyPr>
+          <a:lstStyle/>
+          <a:p>
+            <a:r>
+              <a:rPr lang="sr-Latn-RS" b="1" dirty="0"/>
+              <a:t>CQRS + DDD</a:t>
+            </a:r>
+          </a:p>
+          <a:p>
+            <a:pPr marL="285750" indent="-285750">
+              <a:buFont typeface="Arial" panose="020B0604020202020204" pitchFamily="34" charset="0"/>
+              <a:buChar char="•"/>
+            </a:pPr>
+            <a:r>
+              <a:rPr lang="sr-Latn-RS" dirty="0"/>
+              <a:t>Arhitekturni pattern i pristup u razvoju softvera</a:t>
+            </a:r>
+          </a:p>
+          <a:p>
+            <a:pPr marL="285750" indent="-285750">
+              <a:buFont typeface="Arial" panose="020B0604020202020204" pitchFamily="34" charset="0"/>
+              <a:buChar char="•"/>
+            </a:pPr>
+            <a:r>
+              <a:rPr lang="sr-Latn-RS" dirty="0"/>
+              <a:t>CQRS upiti i komande mogu biti na nivou DDD aggregate-a</a:t>
+            </a:r>
+          </a:p>
+          <a:p>
+            <a:pPr marL="285750" indent="-285750">
+              <a:buFont typeface="Arial" panose="020B0604020202020204" pitchFamily="34" charset="0"/>
+              <a:buChar char="•"/>
+            </a:pPr>
+            <a:r>
+              <a:rPr lang="sr-Latn-RS" dirty="0"/>
+              <a:t>DDD i CQRS podržavaju događaje</a:t>
+            </a:r>
+          </a:p>
+          <a:p>
+            <a:pPr marL="285750" indent="-285750">
+              <a:buFont typeface="Arial" panose="020B0604020202020204" pitchFamily="34" charset="0"/>
+              <a:buChar char="•"/>
+            </a:pPr>
+            <a:r>
+              <a:rPr lang="sr-Latn-RS" dirty="0"/>
+              <a:t>DDD ima bounded context – izražava granice, kao i CQRS preko upita i komandi</a:t>
+            </a:r>
+            <a:endParaRPr lang="en-US" dirty="0"/>
+          </a:p>
+          <a:p>
+            <a:pPr marL="285750" indent="-285750">
+              <a:buFont typeface="Arial" panose="020B0604020202020204" pitchFamily="34" charset="0"/>
+              <a:buChar char="•"/>
+            </a:pPr>
+            <a:endParaRPr lang="sr-Latn-RS" dirty="0"/>
+          </a:p>
+          <a:p>
+            <a:pPr marL="285750" indent="-285750">
+              <a:buFont typeface="Arial" panose="020B0604020202020204" pitchFamily="34" charset="0"/>
+              <a:buChar char="•"/>
+            </a:pPr>
+            <a:endParaRPr lang="sr-Latn-RS" dirty="0"/>
+          </a:p>
+          <a:p>
+            <a:pPr marL="285750" indent="-285750">
+              <a:buFont typeface="Arial" panose="020B0604020202020204" pitchFamily="34" charset="0"/>
+              <a:buChar char="•"/>
+            </a:pPr>
+            <a:endParaRPr lang="sr-Latn-RS" dirty="0"/>
+          </a:p>
+          <a:p>
+            <a:pPr marL="285750" indent="-285750">
+              <a:buFont typeface="Arial" panose="020B0604020202020204" pitchFamily="34" charset="0"/>
+              <a:buChar char="•"/>
+            </a:pPr>
             <a:endParaRPr lang="en-US" dirty="0"/>
           </a:p>
         </p:txBody>

</xml_diff>